<commit_message>
All updated results and new plots with updated tex files
</commit_message>
<xml_diff>
--- a/ThesisCreations.pptx
+++ b/ThesisCreations.pptx
@@ -8,6 +8,7 @@
     <p:sldId id="256" r:id="rId2"/>
     <p:sldId id="257" r:id="rId3"/>
     <p:sldId id="258" r:id="rId4"/>
+    <p:sldId id="259" r:id="rId5"/>
   </p:sldIdLst>
   <p:sldSz cx="9144000" cy="6858000" type="screen4x3"/>
   <p:notesSz cx="6858000" cy="9144000"/>
@@ -3388,7 +3389,7 @@
           <a:p>
             <a:fld id="{A869FB7E-07FD-426A-8797-D2BA08462A5E}" type="datetimeFigureOut">
               <a:rPr lang="en-US" smtClean="0"/>
-              <a:t>12/1/2016</a:t>
+              <a:t>2/14/2017</a:t>
             </a:fld>
             <a:endParaRPr lang="en-US"/>
           </a:p>
@@ -3558,7 +3559,7 @@
           <a:p>
             <a:fld id="{A869FB7E-07FD-426A-8797-D2BA08462A5E}" type="datetimeFigureOut">
               <a:rPr lang="en-US" smtClean="0"/>
-              <a:t>12/1/2016</a:t>
+              <a:t>2/14/2017</a:t>
             </a:fld>
             <a:endParaRPr lang="en-US"/>
           </a:p>
@@ -3738,7 +3739,7 @@
           <a:p>
             <a:fld id="{A869FB7E-07FD-426A-8797-D2BA08462A5E}" type="datetimeFigureOut">
               <a:rPr lang="en-US" smtClean="0"/>
-              <a:t>12/1/2016</a:t>
+              <a:t>2/14/2017</a:t>
             </a:fld>
             <a:endParaRPr lang="en-US"/>
           </a:p>
@@ -3908,7 +3909,7 @@
           <a:p>
             <a:fld id="{A869FB7E-07FD-426A-8797-D2BA08462A5E}" type="datetimeFigureOut">
               <a:rPr lang="en-US" smtClean="0"/>
-              <a:t>12/1/2016</a:t>
+              <a:t>2/14/2017</a:t>
             </a:fld>
             <a:endParaRPr lang="en-US"/>
           </a:p>
@@ -4154,7 +4155,7 @@
           <a:p>
             <a:fld id="{A869FB7E-07FD-426A-8797-D2BA08462A5E}" type="datetimeFigureOut">
               <a:rPr lang="en-US" smtClean="0"/>
-              <a:t>12/1/2016</a:t>
+              <a:t>2/14/2017</a:t>
             </a:fld>
             <a:endParaRPr lang="en-US"/>
           </a:p>
@@ -4442,7 +4443,7 @@
           <a:p>
             <a:fld id="{A869FB7E-07FD-426A-8797-D2BA08462A5E}" type="datetimeFigureOut">
               <a:rPr lang="en-US" smtClean="0"/>
-              <a:t>12/1/2016</a:t>
+              <a:t>2/14/2017</a:t>
             </a:fld>
             <a:endParaRPr lang="en-US"/>
           </a:p>
@@ -4864,7 +4865,7 @@
           <a:p>
             <a:fld id="{A869FB7E-07FD-426A-8797-D2BA08462A5E}" type="datetimeFigureOut">
               <a:rPr lang="en-US" smtClean="0"/>
-              <a:t>12/1/2016</a:t>
+              <a:t>2/14/2017</a:t>
             </a:fld>
             <a:endParaRPr lang="en-US"/>
           </a:p>
@@ -4982,7 +4983,7 @@
           <a:p>
             <a:fld id="{A869FB7E-07FD-426A-8797-D2BA08462A5E}" type="datetimeFigureOut">
               <a:rPr lang="en-US" smtClean="0"/>
-              <a:t>12/1/2016</a:t>
+              <a:t>2/14/2017</a:t>
             </a:fld>
             <a:endParaRPr lang="en-US"/>
           </a:p>
@@ -5077,7 +5078,7 @@
           <a:p>
             <a:fld id="{A869FB7E-07FD-426A-8797-D2BA08462A5E}" type="datetimeFigureOut">
               <a:rPr lang="en-US" smtClean="0"/>
-              <a:t>12/1/2016</a:t>
+              <a:t>2/14/2017</a:t>
             </a:fld>
             <a:endParaRPr lang="en-US"/>
           </a:p>
@@ -5354,7 +5355,7 @@
           <a:p>
             <a:fld id="{A869FB7E-07FD-426A-8797-D2BA08462A5E}" type="datetimeFigureOut">
               <a:rPr lang="en-US" smtClean="0"/>
-              <a:t>12/1/2016</a:t>
+              <a:t>2/14/2017</a:t>
             </a:fld>
             <a:endParaRPr lang="en-US"/>
           </a:p>
@@ -5607,7 +5608,7 @@
           <a:p>
             <a:fld id="{A869FB7E-07FD-426A-8797-D2BA08462A5E}" type="datetimeFigureOut">
               <a:rPr lang="en-US" smtClean="0"/>
-              <a:t>12/1/2016</a:t>
+              <a:t>2/14/2017</a:t>
             </a:fld>
             <a:endParaRPr lang="en-US"/>
           </a:p>
@@ -5820,7 +5821,7 @@
           <a:p>
             <a:fld id="{A869FB7E-07FD-426A-8797-D2BA08462A5E}" type="datetimeFigureOut">
               <a:rPr lang="en-US" smtClean="0"/>
-              <a:t>12/1/2016</a:t>
+              <a:t>2/14/2017</a:t>
             </a:fld>
             <a:endParaRPr lang="en-US"/>
           </a:p>
@@ -12021,6 +12022,1553 @@
 </p:sld>
 </file>
 
+<file path=ppt/slides/slide4.xml><?xml version="1.0" encoding="utf-8"?>
+<p:sld xmlns:a="http://schemas.openxmlformats.org/drawingml/2006/main" xmlns:r="http://schemas.openxmlformats.org/officeDocument/2006/relationships" xmlns:p="http://schemas.openxmlformats.org/presentationml/2006/main">
+  <p:cSld>
+    <p:spTree>
+      <p:nvGrpSpPr>
+        <p:cNvPr id="1" name=""/>
+        <p:cNvGrpSpPr/>
+        <p:nvPr/>
+      </p:nvGrpSpPr>
+      <p:grpSpPr>
+        <a:xfrm>
+          <a:off x="0" y="0"/>
+          <a:ext cx="0" cy="0"/>
+          <a:chOff x="0" y="0"/>
+          <a:chExt cx="0" cy="0"/>
+        </a:xfrm>
+      </p:grpSpPr>
+      <p:sp>
+        <p:nvSpPr>
+          <p:cNvPr id="4" name="Oval 3"/>
+          <p:cNvSpPr/>
+          <p:nvPr/>
+        </p:nvSpPr>
+        <p:spPr>
+          <a:xfrm>
+            <a:off x="4038600" y="3048000"/>
+            <a:ext cx="457200" cy="457200"/>
+          </a:xfrm>
+          <a:prstGeom prst="ellipse">
+            <a:avLst/>
+          </a:prstGeom>
+          <a:solidFill>
+            <a:schemeClr val="tx1">
+              <a:lumMod val="65000"/>
+              <a:lumOff val="35000"/>
+            </a:schemeClr>
+          </a:solidFill>
+          <a:ln>
+            <a:noFill/>
+          </a:ln>
+        </p:spPr>
+        <p:style>
+          <a:lnRef idx="2">
+            <a:schemeClr val="accent1">
+              <a:shade val="50000"/>
+            </a:schemeClr>
+          </a:lnRef>
+          <a:fillRef idx="1">
+            <a:schemeClr val="accent1"/>
+          </a:fillRef>
+          <a:effectRef idx="0">
+            <a:schemeClr val="accent1"/>
+          </a:effectRef>
+          <a:fontRef idx="minor">
+            <a:schemeClr val="lt1"/>
+          </a:fontRef>
+        </p:style>
+        <p:txBody>
+          <a:bodyPr rtlCol="0" anchor="ctr"/>
+          <a:lstStyle/>
+          <a:p>
+            <a:pPr algn="ctr"/>
+            <a:endParaRPr lang="en-US"/>
+          </a:p>
+        </p:txBody>
+      </p:sp>
+      <p:sp>
+        <p:nvSpPr>
+          <p:cNvPr id="5" name="Oval 4"/>
+          <p:cNvSpPr/>
+          <p:nvPr/>
+        </p:nvSpPr>
+        <p:spPr>
+          <a:xfrm>
+            <a:off x="4038600" y="2438400"/>
+            <a:ext cx="457200" cy="457200"/>
+          </a:xfrm>
+          <a:prstGeom prst="ellipse">
+            <a:avLst/>
+          </a:prstGeom>
+          <a:solidFill>
+            <a:schemeClr val="tx1">
+              <a:lumMod val="65000"/>
+              <a:lumOff val="35000"/>
+            </a:schemeClr>
+          </a:solidFill>
+          <a:ln>
+            <a:noFill/>
+          </a:ln>
+        </p:spPr>
+        <p:style>
+          <a:lnRef idx="2">
+            <a:schemeClr val="accent1">
+              <a:shade val="50000"/>
+            </a:schemeClr>
+          </a:lnRef>
+          <a:fillRef idx="1">
+            <a:schemeClr val="accent1"/>
+          </a:fillRef>
+          <a:effectRef idx="0">
+            <a:schemeClr val="accent1"/>
+          </a:effectRef>
+          <a:fontRef idx="minor">
+            <a:schemeClr val="lt1"/>
+          </a:fontRef>
+        </p:style>
+        <p:txBody>
+          <a:bodyPr rtlCol="0" anchor="ctr"/>
+          <a:lstStyle/>
+          <a:p>
+            <a:pPr algn="ctr"/>
+            <a:endParaRPr lang="en-US"/>
+          </a:p>
+        </p:txBody>
+      </p:sp>
+      <p:sp>
+        <p:nvSpPr>
+          <p:cNvPr id="6" name="Oval 5"/>
+          <p:cNvSpPr/>
+          <p:nvPr/>
+        </p:nvSpPr>
+        <p:spPr>
+          <a:xfrm>
+            <a:off x="4038600" y="1828800"/>
+            <a:ext cx="457200" cy="457200"/>
+          </a:xfrm>
+          <a:prstGeom prst="ellipse">
+            <a:avLst/>
+          </a:prstGeom>
+          <a:solidFill>
+            <a:schemeClr val="tx1">
+              <a:lumMod val="65000"/>
+              <a:lumOff val="35000"/>
+            </a:schemeClr>
+          </a:solidFill>
+          <a:ln>
+            <a:noFill/>
+          </a:ln>
+        </p:spPr>
+        <p:style>
+          <a:lnRef idx="2">
+            <a:schemeClr val="accent1">
+              <a:shade val="50000"/>
+            </a:schemeClr>
+          </a:lnRef>
+          <a:fillRef idx="1">
+            <a:schemeClr val="accent1"/>
+          </a:fillRef>
+          <a:effectRef idx="0">
+            <a:schemeClr val="accent1"/>
+          </a:effectRef>
+          <a:fontRef idx="minor">
+            <a:schemeClr val="lt1"/>
+          </a:fontRef>
+        </p:style>
+        <p:txBody>
+          <a:bodyPr rtlCol="0" anchor="ctr"/>
+          <a:lstStyle/>
+          <a:p>
+            <a:pPr algn="ctr"/>
+            <a:endParaRPr lang="en-US"/>
+          </a:p>
+        </p:txBody>
+      </p:sp>
+      <p:sp>
+        <p:nvSpPr>
+          <p:cNvPr id="9" name="Oval 8"/>
+          <p:cNvSpPr/>
+          <p:nvPr/>
+        </p:nvSpPr>
+        <p:spPr>
+          <a:xfrm>
+            <a:off x="4038600" y="3657600"/>
+            <a:ext cx="457200" cy="457200"/>
+          </a:xfrm>
+          <a:prstGeom prst="ellipse">
+            <a:avLst/>
+          </a:prstGeom>
+          <a:solidFill>
+            <a:schemeClr val="tx1">
+              <a:lumMod val="65000"/>
+              <a:lumOff val="35000"/>
+            </a:schemeClr>
+          </a:solidFill>
+          <a:ln>
+            <a:noFill/>
+          </a:ln>
+        </p:spPr>
+        <p:style>
+          <a:lnRef idx="2">
+            <a:schemeClr val="accent1">
+              <a:shade val="50000"/>
+            </a:schemeClr>
+          </a:lnRef>
+          <a:fillRef idx="1">
+            <a:schemeClr val="accent1"/>
+          </a:fillRef>
+          <a:effectRef idx="0">
+            <a:schemeClr val="accent1"/>
+          </a:effectRef>
+          <a:fontRef idx="minor">
+            <a:schemeClr val="lt1"/>
+          </a:fontRef>
+        </p:style>
+        <p:txBody>
+          <a:bodyPr rtlCol="0" anchor="ctr"/>
+          <a:lstStyle/>
+          <a:p>
+            <a:pPr algn="ctr"/>
+            <a:endParaRPr lang="en-US"/>
+          </a:p>
+        </p:txBody>
+      </p:sp>
+      <p:sp>
+        <p:nvSpPr>
+          <p:cNvPr id="10" name="Oval 9"/>
+          <p:cNvSpPr/>
+          <p:nvPr/>
+        </p:nvSpPr>
+        <p:spPr>
+          <a:xfrm>
+            <a:off x="5410200" y="3048000"/>
+            <a:ext cx="457200" cy="457200"/>
+          </a:xfrm>
+          <a:prstGeom prst="ellipse">
+            <a:avLst/>
+          </a:prstGeom>
+          <a:solidFill>
+            <a:schemeClr val="tx1">
+              <a:lumMod val="65000"/>
+              <a:lumOff val="35000"/>
+            </a:schemeClr>
+          </a:solidFill>
+          <a:ln>
+            <a:noFill/>
+          </a:ln>
+        </p:spPr>
+        <p:style>
+          <a:lnRef idx="2">
+            <a:schemeClr val="accent1">
+              <a:shade val="50000"/>
+            </a:schemeClr>
+          </a:lnRef>
+          <a:fillRef idx="1">
+            <a:schemeClr val="accent1"/>
+          </a:fillRef>
+          <a:effectRef idx="0">
+            <a:schemeClr val="accent1"/>
+          </a:effectRef>
+          <a:fontRef idx="minor">
+            <a:schemeClr val="lt1"/>
+          </a:fontRef>
+        </p:style>
+        <p:txBody>
+          <a:bodyPr rtlCol="0" anchor="ctr"/>
+          <a:lstStyle/>
+          <a:p>
+            <a:pPr algn="ctr"/>
+            <a:endParaRPr lang="en-US"/>
+          </a:p>
+        </p:txBody>
+      </p:sp>
+      <p:sp>
+        <p:nvSpPr>
+          <p:cNvPr id="11" name="Oval 10"/>
+          <p:cNvSpPr/>
+          <p:nvPr/>
+        </p:nvSpPr>
+        <p:spPr>
+          <a:xfrm>
+            <a:off x="5410200" y="2438400"/>
+            <a:ext cx="457200" cy="457200"/>
+          </a:xfrm>
+          <a:prstGeom prst="ellipse">
+            <a:avLst/>
+          </a:prstGeom>
+          <a:solidFill>
+            <a:schemeClr val="tx1">
+              <a:lumMod val="65000"/>
+              <a:lumOff val="35000"/>
+            </a:schemeClr>
+          </a:solidFill>
+          <a:ln>
+            <a:noFill/>
+          </a:ln>
+        </p:spPr>
+        <p:style>
+          <a:lnRef idx="2">
+            <a:schemeClr val="accent1">
+              <a:shade val="50000"/>
+            </a:schemeClr>
+          </a:lnRef>
+          <a:fillRef idx="1">
+            <a:schemeClr val="accent1"/>
+          </a:fillRef>
+          <a:effectRef idx="0">
+            <a:schemeClr val="accent1"/>
+          </a:effectRef>
+          <a:fontRef idx="minor">
+            <a:schemeClr val="lt1"/>
+          </a:fontRef>
+        </p:style>
+        <p:txBody>
+          <a:bodyPr rtlCol="0" anchor="ctr"/>
+          <a:lstStyle/>
+          <a:p>
+            <a:pPr algn="ctr"/>
+            <a:endParaRPr lang="en-US"/>
+          </a:p>
+        </p:txBody>
+      </p:sp>
+      <p:sp>
+        <p:nvSpPr>
+          <p:cNvPr id="12" name="Oval 11"/>
+          <p:cNvSpPr/>
+          <p:nvPr/>
+        </p:nvSpPr>
+        <p:spPr>
+          <a:xfrm>
+            <a:off x="5410200" y="1828800"/>
+            <a:ext cx="457200" cy="457200"/>
+          </a:xfrm>
+          <a:prstGeom prst="ellipse">
+            <a:avLst/>
+          </a:prstGeom>
+          <a:solidFill>
+            <a:schemeClr val="tx1">
+              <a:lumMod val="65000"/>
+              <a:lumOff val="35000"/>
+            </a:schemeClr>
+          </a:solidFill>
+          <a:ln>
+            <a:noFill/>
+          </a:ln>
+        </p:spPr>
+        <p:style>
+          <a:lnRef idx="2">
+            <a:schemeClr val="accent1">
+              <a:shade val="50000"/>
+            </a:schemeClr>
+          </a:lnRef>
+          <a:fillRef idx="1">
+            <a:schemeClr val="accent1"/>
+          </a:fillRef>
+          <a:effectRef idx="0">
+            <a:schemeClr val="accent1"/>
+          </a:effectRef>
+          <a:fontRef idx="minor">
+            <a:schemeClr val="lt1"/>
+          </a:fontRef>
+        </p:style>
+        <p:txBody>
+          <a:bodyPr rtlCol="0" anchor="ctr"/>
+          <a:lstStyle/>
+          <a:p>
+            <a:pPr algn="ctr"/>
+            <a:endParaRPr lang="en-US"/>
+          </a:p>
+        </p:txBody>
+      </p:sp>
+      <p:sp>
+        <p:nvSpPr>
+          <p:cNvPr id="15" name="Oval 14"/>
+          <p:cNvSpPr/>
+          <p:nvPr/>
+        </p:nvSpPr>
+        <p:spPr>
+          <a:xfrm>
+            <a:off x="5410200" y="3657600"/>
+            <a:ext cx="457200" cy="457200"/>
+          </a:xfrm>
+          <a:prstGeom prst="ellipse">
+            <a:avLst/>
+          </a:prstGeom>
+          <a:solidFill>
+            <a:schemeClr val="tx1">
+              <a:lumMod val="65000"/>
+              <a:lumOff val="35000"/>
+            </a:schemeClr>
+          </a:solidFill>
+          <a:ln>
+            <a:noFill/>
+          </a:ln>
+        </p:spPr>
+        <p:style>
+          <a:lnRef idx="2">
+            <a:schemeClr val="accent1">
+              <a:shade val="50000"/>
+            </a:schemeClr>
+          </a:lnRef>
+          <a:fillRef idx="1">
+            <a:schemeClr val="accent1"/>
+          </a:fillRef>
+          <a:effectRef idx="0">
+            <a:schemeClr val="accent1"/>
+          </a:effectRef>
+          <a:fontRef idx="minor">
+            <a:schemeClr val="lt1"/>
+          </a:fontRef>
+        </p:style>
+        <p:txBody>
+          <a:bodyPr rtlCol="0" anchor="ctr"/>
+          <a:lstStyle/>
+          <a:p>
+            <a:pPr algn="ctr"/>
+            <a:endParaRPr lang="en-US"/>
+          </a:p>
+        </p:txBody>
+      </p:sp>
+      <p:cxnSp>
+        <p:nvCxnSpPr>
+          <p:cNvPr id="17" name="Straight Connector 16"/>
+          <p:cNvCxnSpPr>
+            <a:stCxn id="6" idx="6"/>
+            <a:endCxn id="11" idx="2"/>
+          </p:cNvCxnSpPr>
+          <p:nvPr/>
+        </p:nvCxnSpPr>
+        <p:spPr>
+          <a:xfrm>
+            <a:off x="4495800" y="2057400"/>
+            <a:ext cx="914400" cy="609600"/>
+          </a:xfrm>
+          <a:prstGeom prst="line">
+            <a:avLst/>
+          </a:prstGeom>
+          <a:ln>
+            <a:solidFill>
+              <a:schemeClr val="tx1">
+                <a:lumMod val="65000"/>
+                <a:lumOff val="35000"/>
+              </a:schemeClr>
+            </a:solidFill>
+          </a:ln>
+        </p:spPr>
+        <p:style>
+          <a:lnRef idx="1">
+            <a:schemeClr val="accent1"/>
+          </a:lnRef>
+          <a:fillRef idx="0">
+            <a:schemeClr val="accent1"/>
+          </a:fillRef>
+          <a:effectRef idx="0">
+            <a:schemeClr val="accent1"/>
+          </a:effectRef>
+          <a:fontRef idx="minor">
+            <a:schemeClr val="tx1"/>
+          </a:fontRef>
+        </p:style>
+      </p:cxnSp>
+      <p:cxnSp>
+        <p:nvCxnSpPr>
+          <p:cNvPr id="19" name="Straight Connector 18"/>
+          <p:cNvCxnSpPr>
+            <a:stCxn id="6" idx="6"/>
+            <a:endCxn id="12" idx="2"/>
+          </p:cNvCxnSpPr>
+          <p:nvPr/>
+        </p:nvCxnSpPr>
+        <p:spPr>
+          <a:xfrm>
+            <a:off x="4495800" y="2057400"/>
+            <a:ext cx="914400" cy="0"/>
+          </a:xfrm>
+          <a:prstGeom prst="line">
+            <a:avLst/>
+          </a:prstGeom>
+          <a:ln>
+            <a:solidFill>
+              <a:schemeClr val="tx1">
+                <a:lumMod val="65000"/>
+                <a:lumOff val="35000"/>
+              </a:schemeClr>
+            </a:solidFill>
+          </a:ln>
+        </p:spPr>
+        <p:style>
+          <a:lnRef idx="1">
+            <a:schemeClr val="accent1"/>
+          </a:lnRef>
+          <a:fillRef idx="0">
+            <a:schemeClr val="accent1"/>
+          </a:fillRef>
+          <a:effectRef idx="0">
+            <a:schemeClr val="accent1"/>
+          </a:effectRef>
+          <a:fontRef idx="minor">
+            <a:schemeClr val="tx1"/>
+          </a:fontRef>
+        </p:style>
+      </p:cxnSp>
+      <p:cxnSp>
+        <p:nvCxnSpPr>
+          <p:cNvPr id="22" name="Straight Connector 21"/>
+          <p:cNvCxnSpPr>
+            <a:stCxn id="6" idx="6"/>
+            <a:endCxn id="10" idx="2"/>
+          </p:cNvCxnSpPr>
+          <p:nvPr/>
+        </p:nvCxnSpPr>
+        <p:spPr>
+          <a:xfrm>
+            <a:off x="4495800" y="2057400"/>
+            <a:ext cx="914400" cy="1219200"/>
+          </a:xfrm>
+          <a:prstGeom prst="line">
+            <a:avLst/>
+          </a:prstGeom>
+          <a:ln>
+            <a:solidFill>
+              <a:schemeClr val="tx1">
+                <a:lumMod val="65000"/>
+                <a:lumOff val="35000"/>
+              </a:schemeClr>
+            </a:solidFill>
+          </a:ln>
+        </p:spPr>
+        <p:style>
+          <a:lnRef idx="1">
+            <a:schemeClr val="accent1"/>
+          </a:lnRef>
+          <a:fillRef idx="0">
+            <a:schemeClr val="accent1"/>
+          </a:fillRef>
+          <a:effectRef idx="0">
+            <a:schemeClr val="accent1"/>
+          </a:effectRef>
+          <a:fontRef idx="minor">
+            <a:schemeClr val="tx1"/>
+          </a:fontRef>
+        </p:style>
+      </p:cxnSp>
+      <p:cxnSp>
+        <p:nvCxnSpPr>
+          <p:cNvPr id="25" name="Straight Connector 24"/>
+          <p:cNvCxnSpPr>
+            <a:stCxn id="6" idx="6"/>
+            <a:endCxn id="15" idx="2"/>
+          </p:cNvCxnSpPr>
+          <p:nvPr/>
+        </p:nvCxnSpPr>
+        <p:spPr>
+          <a:xfrm>
+            <a:off x="4495800" y="2057400"/>
+            <a:ext cx="914400" cy="1828800"/>
+          </a:xfrm>
+          <a:prstGeom prst="line">
+            <a:avLst/>
+          </a:prstGeom>
+          <a:ln>
+            <a:solidFill>
+              <a:schemeClr val="tx1">
+                <a:lumMod val="65000"/>
+                <a:lumOff val="35000"/>
+              </a:schemeClr>
+            </a:solidFill>
+          </a:ln>
+        </p:spPr>
+        <p:style>
+          <a:lnRef idx="1">
+            <a:schemeClr val="accent1"/>
+          </a:lnRef>
+          <a:fillRef idx="0">
+            <a:schemeClr val="accent1"/>
+          </a:fillRef>
+          <a:effectRef idx="0">
+            <a:schemeClr val="accent1"/>
+          </a:effectRef>
+          <a:fontRef idx="minor">
+            <a:schemeClr val="tx1"/>
+          </a:fontRef>
+        </p:style>
+      </p:cxnSp>
+      <p:cxnSp>
+        <p:nvCxnSpPr>
+          <p:cNvPr id="28" name="Straight Connector 27"/>
+          <p:cNvCxnSpPr>
+            <a:stCxn id="5" idx="6"/>
+            <a:endCxn id="12" idx="2"/>
+          </p:cNvCxnSpPr>
+          <p:nvPr/>
+        </p:nvCxnSpPr>
+        <p:spPr>
+          <a:xfrm flipV="1">
+            <a:off x="4495800" y="2057400"/>
+            <a:ext cx="914400" cy="609600"/>
+          </a:xfrm>
+          <a:prstGeom prst="line">
+            <a:avLst/>
+          </a:prstGeom>
+          <a:ln>
+            <a:solidFill>
+              <a:schemeClr val="tx1">
+                <a:lumMod val="65000"/>
+                <a:lumOff val="35000"/>
+              </a:schemeClr>
+            </a:solidFill>
+          </a:ln>
+        </p:spPr>
+        <p:style>
+          <a:lnRef idx="1">
+            <a:schemeClr val="accent1"/>
+          </a:lnRef>
+          <a:fillRef idx="0">
+            <a:schemeClr val="accent1"/>
+          </a:fillRef>
+          <a:effectRef idx="0">
+            <a:schemeClr val="accent1"/>
+          </a:effectRef>
+          <a:fontRef idx="minor">
+            <a:schemeClr val="tx1"/>
+          </a:fontRef>
+        </p:style>
+      </p:cxnSp>
+      <p:cxnSp>
+        <p:nvCxnSpPr>
+          <p:cNvPr id="31" name="Straight Connector 30"/>
+          <p:cNvCxnSpPr>
+            <a:stCxn id="5" idx="6"/>
+            <a:endCxn id="11" idx="2"/>
+          </p:cNvCxnSpPr>
+          <p:nvPr/>
+        </p:nvCxnSpPr>
+        <p:spPr>
+          <a:xfrm>
+            <a:off x="4495800" y="2667000"/>
+            <a:ext cx="914400" cy="0"/>
+          </a:xfrm>
+          <a:prstGeom prst="line">
+            <a:avLst/>
+          </a:prstGeom>
+          <a:ln>
+            <a:solidFill>
+              <a:schemeClr val="tx1">
+                <a:lumMod val="65000"/>
+                <a:lumOff val="35000"/>
+              </a:schemeClr>
+            </a:solidFill>
+          </a:ln>
+        </p:spPr>
+        <p:style>
+          <a:lnRef idx="1">
+            <a:schemeClr val="accent1"/>
+          </a:lnRef>
+          <a:fillRef idx="0">
+            <a:schemeClr val="accent1"/>
+          </a:fillRef>
+          <a:effectRef idx="0">
+            <a:schemeClr val="accent1"/>
+          </a:effectRef>
+          <a:fontRef idx="minor">
+            <a:schemeClr val="tx1"/>
+          </a:fontRef>
+        </p:style>
+      </p:cxnSp>
+      <p:cxnSp>
+        <p:nvCxnSpPr>
+          <p:cNvPr id="34" name="Straight Connector 33"/>
+          <p:cNvCxnSpPr>
+            <a:stCxn id="5" idx="6"/>
+            <a:endCxn id="10" idx="2"/>
+          </p:cNvCxnSpPr>
+          <p:nvPr/>
+        </p:nvCxnSpPr>
+        <p:spPr>
+          <a:xfrm>
+            <a:off x="4495800" y="2667000"/>
+            <a:ext cx="914400" cy="609600"/>
+          </a:xfrm>
+          <a:prstGeom prst="line">
+            <a:avLst/>
+          </a:prstGeom>
+          <a:ln>
+            <a:solidFill>
+              <a:schemeClr val="tx1">
+                <a:lumMod val="65000"/>
+                <a:lumOff val="35000"/>
+              </a:schemeClr>
+            </a:solidFill>
+          </a:ln>
+        </p:spPr>
+        <p:style>
+          <a:lnRef idx="1">
+            <a:schemeClr val="accent1"/>
+          </a:lnRef>
+          <a:fillRef idx="0">
+            <a:schemeClr val="accent1"/>
+          </a:fillRef>
+          <a:effectRef idx="0">
+            <a:schemeClr val="accent1"/>
+          </a:effectRef>
+          <a:fontRef idx="minor">
+            <a:schemeClr val="tx1"/>
+          </a:fontRef>
+        </p:style>
+      </p:cxnSp>
+      <p:cxnSp>
+        <p:nvCxnSpPr>
+          <p:cNvPr id="37" name="Straight Connector 36"/>
+          <p:cNvCxnSpPr>
+            <a:stCxn id="5" idx="6"/>
+            <a:endCxn id="15" idx="2"/>
+          </p:cNvCxnSpPr>
+          <p:nvPr/>
+        </p:nvCxnSpPr>
+        <p:spPr>
+          <a:xfrm>
+            <a:off x="4495800" y="2667000"/>
+            <a:ext cx="914400" cy="1219200"/>
+          </a:xfrm>
+          <a:prstGeom prst="line">
+            <a:avLst/>
+          </a:prstGeom>
+          <a:ln>
+            <a:solidFill>
+              <a:schemeClr val="tx1">
+                <a:lumMod val="65000"/>
+                <a:lumOff val="35000"/>
+              </a:schemeClr>
+            </a:solidFill>
+          </a:ln>
+        </p:spPr>
+        <p:style>
+          <a:lnRef idx="1">
+            <a:schemeClr val="accent1"/>
+          </a:lnRef>
+          <a:fillRef idx="0">
+            <a:schemeClr val="accent1"/>
+          </a:fillRef>
+          <a:effectRef idx="0">
+            <a:schemeClr val="accent1"/>
+          </a:effectRef>
+          <a:fontRef idx="minor">
+            <a:schemeClr val="tx1"/>
+          </a:fontRef>
+        </p:style>
+      </p:cxnSp>
+      <p:cxnSp>
+        <p:nvCxnSpPr>
+          <p:cNvPr id="40" name="Straight Connector 39"/>
+          <p:cNvCxnSpPr>
+            <a:stCxn id="4" idx="6"/>
+            <a:endCxn id="12" idx="2"/>
+          </p:cNvCxnSpPr>
+          <p:nvPr/>
+        </p:nvCxnSpPr>
+        <p:spPr>
+          <a:xfrm flipV="1">
+            <a:off x="4495800" y="2057400"/>
+            <a:ext cx="914400" cy="1219200"/>
+          </a:xfrm>
+          <a:prstGeom prst="line">
+            <a:avLst/>
+          </a:prstGeom>
+          <a:ln>
+            <a:solidFill>
+              <a:schemeClr val="tx1">
+                <a:lumMod val="65000"/>
+                <a:lumOff val="35000"/>
+              </a:schemeClr>
+            </a:solidFill>
+          </a:ln>
+        </p:spPr>
+        <p:style>
+          <a:lnRef idx="1">
+            <a:schemeClr val="accent1"/>
+          </a:lnRef>
+          <a:fillRef idx="0">
+            <a:schemeClr val="accent1"/>
+          </a:fillRef>
+          <a:effectRef idx="0">
+            <a:schemeClr val="accent1"/>
+          </a:effectRef>
+          <a:fontRef idx="minor">
+            <a:schemeClr val="tx1"/>
+          </a:fontRef>
+        </p:style>
+      </p:cxnSp>
+      <p:cxnSp>
+        <p:nvCxnSpPr>
+          <p:cNvPr id="43" name="Straight Connector 42"/>
+          <p:cNvCxnSpPr>
+            <a:stCxn id="4" idx="6"/>
+            <a:endCxn id="11" idx="2"/>
+          </p:cNvCxnSpPr>
+          <p:nvPr/>
+        </p:nvCxnSpPr>
+        <p:spPr>
+          <a:xfrm flipV="1">
+            <a:off x="4495800" y="2667000"/>
+            <a:ext cx="914400" cy="609600"/>
+          </a:xfrm>
+          <a:prstGeom prst="line">
+            <a:avLst/>
+          </a:prstGeom>
+          <a:ln>
+            <a:solidFill>
+              <a:schemeClr val="tx1">
+                <a:lumMod val="65000"/>
+                <a:lumOff val="35000"/>
+              </a:schemeClr>
+            </a:solidFill>
+          </a:ln>
+        </p:spPr>
+        <p:style>
+          <a:lnRef idx="1">
+            <a:schemeClr val="accent1"/>
+          </a:lnRef>
+          <a:fillRef idx="0">
+            <a:schemeClr val="accent1"/>
+          </a:fillRef>
+          <a:effectRef idx="0">
+            <a:schemeClr val="accent1"/>
+          </a:effectRef>
+          <a:fontRef idx="minor">
+            <a:schemeClr val="tx1"/>
+          </a:fontRef>
+        </p:style>
+      </p:cxnSp>
+      <p:cxnSp>
+        <p:nvCxnSpPr>
+          <p:cNvPr id="46" name="Straight Connector 45"/>
+          <p:cNvCxnSpPr>
+            <a:stCxn id="9" idx="6"/>
+            <a:endCxn id="15" idx="2"/>
+          </p:cNvCxnSpPr>
+          <p:nvPr/>
+        </p:nvCxnSpPr>
+        <p:spPr>
+          <a:xfrm>
+            <a:off x="4495800" y="3886200"/>
+            <a:ext cx="914400" cy="0"/>
+          </a:xfrm>
+          <a:prstGeom prst="line">
+            <a:avLst/>
+          </a:prstGeom>
+          <a:ln>
+            <a:solidFill>
+              <a:schemeClr val="tx1">
+                <a:lumMod val="65000"/>
+                <a:lumOff val="35000"/>
+              </a:schemeClr>
+            </a:solidFill>
+          </a:ln>
+        </p:spPr>
+        <p:style>
+          <a:lnRef idx="1">
+            <a:schemeClr val="accent1"/>
+          </a:lnRef>
+          <a:fillRef idx="0">
+            <a:schemeClr val="accent1"/>
+          </a:fillRef>
+          <a:effectRef idx="0">
+            <a:schemeClr val="accent1"/>
+          </a:effectRef>
+          <a:fontRef idx="minor">
+            <a:schemeClr val="tx1"/>
+          </a:fontRef>
+        </p:style>
+      </p:cxnSp>
+      <p:cxnSp>
+        <p:nvCxnSpPr>
+          <p:cNvPr id="49" name="Straight Connector 48"/>
+          <p:cNvCxnSpPr>
+            <a:stCxn id="9" idx="6"/>
+            <a:endCxn id="10" idx="2"/>
+          </p:cNvCxnSpPr>
+          <p:nvPr/>
+        </p:nvCxnSpPr>
+        <p:spPr>
+          <a:xfrm flipV="1">
+            <a:off x="4495800" y="3276600"/>
+            <a:ext cx="914400" cy="609600"/>
+          </a:xfrm>
+          <a:prstGeom prst="line">
+            <a:avLst/>
+          </a:prstGeom>
+          <a:ln>
+            <a:solidFill>
+              <a:schemeClr val="tx1">
+                <a:lumMod val="65000"/>
+                <a:lumOff val="35000"/>
+              </a:schemeClr>
+            </a:solidFill>
+          </a:ln>
+        </p:spPr>
+        <p:style>
+          <a:lnRef idx="1">
+            <a:schemeClr val="accent1"/>
+          </a:lnRef>
+          <a:fillRef idx="0">
+            <a:schemeClr val="accent1"/>
+          </a:fillRef>
+          <a:effectRef idx="0">
+            <a:schemeClr val="accent1"/>
+          </a:effectRef>
+          <a:fontRef idx="minor">
+            <a:schemeClr val="tx1"/>
+          </a:fontRef>
+        </p:style>
+      </p:cxnSp>
+      <p:cxnSp>
+        <p:nvCxnSpPr>
+          <p:cNvPr id="52" name="Straight Connector 51"/>
+          <p:cNvCxnSpPr>
+            <a:stCxn id="9" idx="6"/>
+            <a:endCxn id="11" idx="2"/>
+          </p:cNvCxnSpPr>
+          <p:nvPr/>
+        </p:nvCxnSpPr>
+        <p:spPr>
+          <a:xfrm flipV="1">
+            <a:off x="4495800" y="2667000"/>
+            <a:ext cx="914400" cy="1219200"/>
+          </a:xfrm>
+          <a:prstGeom prst="line">
+            <a:avLst/>
+          </a:prstGeom>
+          <a:ln>
+            <a:solidFill>
+              <a:schemeClr val="tx1">
+                <a:lumMod val="65000"/>
+                <a:lumOff val="35000"/>
+              </a:schemeClr>
+            </a:solidFill>
+          </a:ln>
+        </p:spPr>
+        <p:style>
+          <a:lnRef idx="1">
+            <a:schemeClr val="accent1"/>
+          </a:lnRef>
+          <a:fillRef idx="0">
+            <a:schemeClr val="accent1"/>
+          </a:fillRef>
+          <a:effectRef idx="0">
+            <a:schemeClr val="accent1"/>
+          </a:effectRef>
+          <a:fontRef idx="minor">
+            <a:schemeClr val="tx1"/>
+          </a:fontRef>
+        </p:style>
+      </p:cxnSp>
+      <p:cxnSp>
+        <p:nvCxnSpPr>
+          <p:cNvPr id="55" name="Straight Connector 54"/>
+          <p:cNvCxnSpPr>
+            <a:stCxn id="4" idx="6"/>
+            <a:endCxn id="15" idx="2"/>
+          </p:cNvCxnSpPr>
+          <p:nvPr/>
+        </p:nvCxnSpPr>
+        <p:spPr>
+          <a:xfrm>
+            <a:off x="4495800" y="3276600"/>
+            <a:ext cx="914400" cy="609600"/>
+          </a:xfrm>
+          <a:prstGeom prst="line">
+            <a:avLst/>
+          </a:prstGeom>
+          <a:ln>
+            <a:solidFill>
+              <a:schemeClr val="tx1">
+                <a:lumMod val="65000"/>
+                <a:lumOff val="35000"/>
+              </a:schemeClr>
+            </a:solidFill>
+          </a:ln>
+        </p:spPr>
+        <p:style>
+          <a:lnRef idx="1">
+            <a:schemeClr val="accent1"/>
+          </a:lnRef>
+          <a:fillRef idx="0">
+            <a:schemeClr val="accent1"/>
+          </a:fillRef>
+          <a:effectRef idx="0">
+            <a:schemeClr val="accent1"/>
+          </a:effectRef>
+          <a:fontRef idx="minor">
+            <a:schemeClr val="tx1"/>
+          </a:fontRef>
+        </p:style>
+      </p:cxnSp>
+      <p:cxnSp>
+        <p:nvCxnSpPr>
+          <p:cNvPr id="58" name="Straight Connector 57"/>
+          <p:cNvCxnSpPr>
+            <a:stCxn id="4" idx="6"/>
+            <a:endCxn id="10" idx="2"/>
+          </p:cNvCxnSpPr>
+          <p:nvPr/>
+        </p:nvCxnSpPr>
+        <p:spPr>
+          <a:xfrm>
+            <a:off x="4495800" y="3276600"/>
+            <a:ext cx="914400" cy="0"/>
+          </a:xfrm>
+          <a:prstGeom prst="line">
+            <a:avLst/>
+          </a:prstGeom>
+          <a:ln>
+            <a:solidFill>
+              <a:schemeClr val="tx1">
+                <a:lumMod val="65000"/>
+                <a:lumOff val="35000"/>
+              </a:schemeClr>
+            </a:solidFill>
+          </a:ln>
+        </p:spPr>
+        <p:style>
+          <a:lnRef idx="1">
+            <a:schemeClr val="accent1"/>
+          </a:lnRef>
+          <a:fillRef idx="0">
+            <a:schemeClr val="accent1"/>
+          </a:fillRef>
+          <a:effectRef idx="0">
+            <a:schemeClr val="accent1"/>
+          </a:effectRef>
+          <a:fontRef idx="minor">
+            <a:schemeClr val="tx1"/>
+          </a:fontRef>
+        </p:style>
+      </p:cxnSp>
+      <p:cxnSp>
+        <p:nvCxnSpPr>
+          <p:cNvPr id="62" name="Curved Connector 61"/>
+          <p:cNvCxnSpPr>
+            <a:stCxn id="5" idx="2"/>
+            <a:endCxn id="6" idx="2"/>
+          </p:cNvCxnSpPr>
+          <p:nvPr/>
+        </p:nvCxnSpPr>
+        <p:spPr>
+          <a:xfrm rot="10800000">
+            <a:off x="4038600" y="2057400"/>
+            <a:ext cx="12700" cy="609600"/>
+          </a:xfrm>
+          <a:prstGeom prst="curvedConnector3">
+            <a:avLst>
+              <a:gd name="adj1" fmla="val 1800000"/>
+            </a:avLst>
+          </a:prstGeom>
+          <a:ln>
+            <a:solidFill>
+              <a:schemeClr val="tx1">
+                <a:lumMod val="65000"/>
+                <a:lumOff val="35000"/>
+              </a:schemeClr>
+            </a:solidFill>
+            <a:tailEnd type="arrow"/>
+          </a:ln>
+        </p:spPr>
+        <p:style>
+          <a:lnRef idx="1">
+            <a:schemeClr val="accent1"/>
+          </a:lnRef>
+          <a:fillRef idx="0">
+            <a:schemeClr val="accent1"/>
+          </a:fillRef>
+          <a:effectRef idx="0">
+            <a:schemeClr val="accent1"/>
+          </a:effectRef>
+          <a:fontRef idx="minor">
+            <a:schemeClr val="tx1"/>
+          </a:fontRef>
+        </p:style>
+      </p:cxnSp>
+      <p:cxnSp>
+        <p:nvCxnSpPr>
+          <p:cNvPr id="64" name="Curved Connector 63"/>
+          <p:cNvCxnSpPr>
+            <a:stCxn id="5" idx="2"/>
+            <a:endCxn id="4" idx="2"/>
+          </p:cNvCxnSpPr>
+          <p:nvPr/>
+        </p:nvCxnSpPr>
+        <p:spPr>
+          <a:xfrm rot="10800000" flipV="1">
+            <a:off x="4038600" y="2667000"/>
+            <a:ext cx="12700" cy="609600"/>
+          </a:xfrm>
+          <a:prstGeom prst="curvedConnector3">
+            <a:avLst>
+              <a:gd name="adj1" fmla="val 1800000"/>
+            </a:avLst>
+          </a:prstGeom>
+          <a:ln>
+            <a:solidFill>
+              <a:schemeClr val="tx1">
+                <a:lumMod val="65000"/>
+                <a:lumOff val="35000"/>
+              </a:schemeClr>
+            </a:solidFill>
+            <a:tailEnd type="arrow"/>
+          </a:ln>
+        </p:spPr>
+        <p:style>
+          <a:lnRef idx="1">
+            <a:schemeClr val="accent1"/>
+          </a:lnRef>
+          <a:fillRef idx="0">
+            <a:schemeClr val="accent1"/>
+          </a:fillRef>
+          <a:effectRef idx="0">
+            <a:schemeClr val="accent1"/>
+          </a:effectRef>
+          <a:fontRef idx="minor">
+            <a:schemeClr val="tx1"/>
+          </a:fontRef>
+        </p:style>
+      </p:cxnSp>
+      <p:cxnSp>
+        <p:nvCxnSpPr>
+          <p:cNvPr id="67" name="Curved Connector 66"/>
+          <p:cNvCxnSpPr>
+            <a:stCxn id="5" idx="2"/>
+            <a:endCxn id="9" idx="2"/>
+          </p:cNvCxnSpPr>
+          <p:nvPr/>
+        </p:nvCxnSpPr>
+        <p:spPr>
+          <a:xfrm rot="10800000" flipV="1">
+            <a:off x="4038600" y="2667000"/>
+            <a:ext cx="12700" cy="1219200"/>
+          </a:xfrm>
+          <a:prstGeom prst="curvedConnector3">
+            <a:avLst>
+              <a:gd name="adj1" fmla="val 1800000"/>
+            </a:avLst>
+          </a:prstGeom>
+          <a:ln>
+            <a:solidFill>
+              <a:schemeClr val="tx1">
+                <a:lumMod val="65000"/>
+                <a:lumOff val="35000"/>
+              </a:schemeClr>
+            </a:solidFill>
+            <a:tailEnd type="arrow"/>
+          </a:ln>
+        </p:spPr>
+        <p:style>
+          <a:lnRef idx="1">
+            <a:schemeClr val="accent1"/>
+          </a:lnRef>
+          <a:fillRef idx="0">
+            <a:schemeClr val="accent1"/>
+          </a:fillRef>
+          <a:effectRef idx="0">
+            <a:schemeClr val="accent1"/>
+          </a:effectRef>
+          <a:fontRef idx="minor">
+            <a:schemeClr val="tx1"/>
+          </a:fontRef>
+        </p:style>
+      </p:cxnSp>
+      <p:cxnSp>
+        <p:nvCxnSpPr>
+          <p:cNvPr id="70" name="Curved Connector 69"/>
+          <p:cNvCxnSpPr>
+            <a:stCxn id="6" idx="2"/>
+            <a:endCxn id="9" idx="2"/>
+          </p:cNvCxnSpPr>
+          <p:nvPr/>
+        </p:nvCxnSpPr>
+        <p:spPr>
+          <a:xfrm rot="10800000" flipV="1">
+            <a:off x="4038600" y="2057400"/>
+            <a:ext cx="12700" cy="1828800"/>
+          </a:xfrm>
+          <a:prstGeom prst="curvedConnector3">
+            <a:avLst>
+              <a:gd name="adj1" fmla="val 1800000"/>
+            </a:avLst>
+          </a:prstGeom>
+          <a:ln>
+            <a:solidFill>
+              <a:schemeClr val="tx1">
+                <a:lumMod val="65000"/>
+                <a:lumOff val="35000"/>
+              </a:schemeClr>
+            </a:solidFill>
+            <a:tailEnd type="arrow"/>
+          </a:ln>
+        </p:spPr>
+        <p:style>
+          <a:lnRef idx="1">
+            <a:schemeClr val="accent1"/>
+          </a:lnRef>
+          <a:fillRef idx="0">
+            <a:schemeClr val="accent1"/>
+          </a:fillRef>
+          <a:effectRef idx="0">
+            <a:schemeClr val="accent1"/>
+          </a:effectRef>
+          <a:fontRef idx="minor">
+            <a:schemeClr val="tx1"/>
+          </a:fontRef>
+        </p:style>
+      </p:cxnSp>
+      <p:cxnSp>
+        <p:nvCxnSpPr>
+          <p:cNvPr id="73" name="Curved Connector 72"/>
+          <p:cNvCxnSpPr>
+            <a:stCxn id="6" idx="6"/>
+            <a:endCxn id="4" idx="6"/>
+          </p:cNvCxnSpPr>
+          <p:nvPr/>
+        </p:nvCxnSpPr>
+        <p:spPr>
+          <a:xfrm>
+            <a:off x="4495800" y="2057400"/>
+            <a:ext cx="12700" cy="1219200"/>
+          </a:xfrm>
+          <a:prstGeom prst="curvedConnector3">
+            <a:avLst>
+              <a:gd name="adj1" fmla="val 1800000"/>
+            </a:avLst>
+          </a:prstGeom>
+          <a:ln>
+            <a:solidFill>
+              <a:schemeClr val="tx1">
+                <a:lumMod val="65000"/>
+                <a:lumOff val="35000"/>
+              </a:schemeClr>
+            </a:solidFill>
+            <a:tailEnd type="arrow"/>
+          </a:ln>
+        </p:spPr>
+        <p:style>
+          <a:lnRef idx="1">
+            <a:schemeClr val="accent1"/>
+          </a:lnRef>
+          <a:fillRef idx="0">
+            <a:schemeClr val="accent1"/>
+          </a:fillRef>
+          <a:effectRef idx="0">
+            <a:schemeClr val="accent1"/>
+          </a:effectRef>
+          <a:fontRef idx="minor">
+            <a:schemeClr val="tx1"/>
+          </a:fontRef>
+        </p:style>
+      </p:cxnSp>
+      <p:cxnSp>
+        <p:nvCxnSpPr>
+          <p:cNvPr id="76" name="Curved Connector 75"/>
+          <p:cNvCxnSpPr>
+            <a:stCxn id="12" idx="6"/>
+            <a:endCxn id="11" idx="6"/>
+          </p:cNvCxnSpPr>
+          <p:nvPr/>
+        </p:nvCxnSpPr>
+        <p:spPr>
+          <a:xfrm>
+            <a:off x="5867400" y="2057400"/>
+            <a:ext cx="12700" cy="609600"/>
+          </a:xfrm>
+          <a:prstGeom prst="curvedConnector3">
+            <a:avLst>
+              <a:gd name="adj1" fmla="val 1800000"/>
+            </a:avLst>
+          </a:prstGeom>
+          <a:ln>
+            <a:solidFill>
+              <a:schemeClr val="tx1">
+                <a:lumMod val="65000"/>
+                <a:lumOff val="35000"/>
+              </a:schemeClr>
+            </a:solidFill>
+            <a:tailEnd type="arrow"/>
+          </a:ln>
+        </p:spPr>
+        <p:style>
+          <a:lnRef idx="1">
+            <a:schemeClr val="accent1"/>
+          </a:lnRef>
+          <a:fillRef idx="0">
+            <a:schemeClr val="accent1"/>
+          </a:fillRef>
+          <a:effectRef idx="0">
+            <a:schemeClr val="accent1"/>
+          </a:effectRef>
+          <a:fontRef idx="minor">
+            <a:schemeClr val="tx1"/>
+          </a:fontRef>
+        </p:style>
+      </p:cxnSp>
+      <p:cxnSp>
+        <p:nvCxnSpPr>
+          <p:cNvPr id="79" name="Curved Connector 78"/>
+          <p:cNvCxnSpPr>
+            <a:stCxn id="11" idx="6"/>
+            <a:endCxn id="10" idx="6"/>
+          </p:cNvCxnSpPr>
+          <p:nvPr/>
+        </p:nvCxnSpPr>
+        <p:spPr>
+          <a:xfrm>
+            <a:off x="5867400" y="2667000"/>
+            <a:ext cx="12700" cy="609600"/>
+          </a:xfrm>
+          <a:prstGeom prst="curvedConnector3">
+            <a:avLst>
+              <a:gd name="adj1" fmla="val 1800000"/>
+            </a:avLst>
+          </a:prstGeom>
+          <a:ln>
+            <a:solidFill>
+              <a:schemeClr val="tx1">
+                <a:lumMod val="65000"/>
+                <a:lumOff val="35000"/>
+              </a:schemeClr>
+            </a:solidFill>
+            <a:tailEnd type="arrow"/>
+          </a:ln>
+        </p:spPr>
+        <p:style>
+          <a:lnRef idx="1">
+            <a:schemeClr val="accent1"/>
+          </a:lnRef>
+          <a:fillRef idx="0">
+            <a:schemeClr val="accent1"/>
+          </a:fillRef>
+          <a:effectRef idx="0">
+            <a:schemeClr val="accent1"/>
+          </a:effectRef>
+          <a:fontRef idx="minor">
+            <a:schemeClr val="tx1"/>
+          </a:fontRef>
+        </p:style>
+      </p:cxnSp>
+      <p:cxnSp>
+        <p:nvCxnSpPr>
+          <p:cNvPr id="82" name="Curved Connector 81"/>
+          <p:cNvCxnSpPr>
+            <a:stCxn id="10" idx="6"/>
+            <a:endCxn id="15" idx="6"/>
+          </p:cNvCxnSpPr>
+          <p:nvPr/>
+        </p:nvCxnSpPr>
+        <p:spPr>
+          <a:xfrm>
+            <a:off x="5867400" y="3276600"/>
+            <a:ext cx="12700" cy="609600"/>
+          </a:xfrm>
+          <a:prstGeom prst="curvedConnector3">
+            <a:avLst>
+              <a:gd name="adj1" fmla="val 1800000"/>
+            </a:avLst>
+          </a:prstGeom>
+          <a:ln>
+            <a:solidFill>
+              <a:schemeClr val="tx1">
+                <a:lumMod val="65000"/>
+                <a:lumOff val="35000"/>
+              </a:schemeClr>
+            </a:solidFill>
+            <a:tailEnd type="arrow"/>
+          </a:ln>
+        </p:spPr>
+        <p:style>
+          <a:lnRef idx="1">
+            <a:schemeClr val="accent1"/>
+          </a:lnRef>
+          <a:fillRef idx="0">
+            <a:schemeClr val="accent1"/>
+          </a:fillRef>
+          <a:effectRef idx="0">
+            <a:schemeClr val="accent1"/>
+          </a:effectRef>
+          <a:fontRef idx="minor">
+            <a:schemeClr val="tx1"/>
+          </a:fontRef>
+        </p:style>
+      </p:cxnSp>
+      <p:cxnSp>
+        <p:nvCxnSpPr>
+          <p:cNvPr id="85" name="Curved Connector 84"/>
+          <p:cNvCxnSpPr>
+            <a:stCxn id="12" idx="6"/>
+            <a:endCxn id="10" idx="6"/>
+          </p:cNvCxnSpPr>
+          <p:nvPr/>
+        </p:nvCxnSpPr>
+        <p:spPr>
+          <a:xfrm>
+            <a:off x="5867400" y="2057400"/>
+            <a:ext cx="12700" cy="1219200"/>
+          </a:xfrm>
+          <a:prstGeom prst="curvedConnector3">
+            <a:avLst>
+              <a:gd name="adj1" fmla="val 1800000"/>
+            </a:avLst>
+          </a:prstGeom>
+          <a:ln>
+            <a:solidFill>
+              <a:schemeClr val="tx1">
+                <a:lumMod val="65000"/>
+                <a:lumOff val="35000"/>
+              </a:schemeClr>
+            </a:solidFill>
+            <a:tailEnd type="arrow"/>
+          </a:ln>
+        </p:spPr>
+        <p:style>
+          <a:lnRef idx="1">
+            <a:schemeClr val="accent1"/>
+          </a:lnRef>
+          <a:fillRef idx="0">
+            <a:schemeClr val="accent1"/>
+          </a:fillRef>
+          <a:effectRef idx="0">
+            <a:schemeClr val="accent1"/>
+          </a:effectRef>
+          <a:fontRef idx="minor">
+            <a:schemeClr val="tx1"/>
+          </a:fontRef>
+        </p:style>
+      </p:cxnSp>
+      <p:sp>
+        <p:nvSpPr>
+          <p:cNvPr id="89" name="TextBox 88"/>
+          <p:cNvSpPr txBox="1"/>
+          <p:nvPr/>
+        </p:nvSpPr>
+        <p:spPr>
+          <a:xfrm>
+            <a:off x="3222008" y="2460008"/>
+            <a:ext cx="717823" cy="707886"/>
+          </a:xfrm>
+          <a:prstGeom prst="rect">
+            <a:avLst/>
+          </a:prstGeom>
+          <a:noFill/>
+        </p:spPr>
+        <p:txBody>
+          <a:bodyPr wrap="square" rtlCol="0">
+            <a:spAutoFit/>
+          </a:bodyPr>
+          <a:lstStyle/>
+          <a:p>
+            <a:pPr algn="ctr"/>
+            <a:r>
+              <a:rPr lang="en-US" sz="800" dirty="0" smtClean="0"/>
+              <a:t>Connections within </a:t>
+            </a:r>
+          </a:p>
+          <a:p>
+            <a:pPr algn="ctr"/>
+            <a:r>
+              <a:rPr lang="en-US" sz="800" dirty="0" smtClean="0"/>
+              <a:t>Same hidden layer neurons</a:t>
+            </a:r>
+            <a:endParaRPr lang="en-US" sz="800" dirty="0"/>
+          </a:p>
+        </p:txBody>
+      </p:sp>
+      <p:cxnSp>
+        <p:nvCxnSpPr>
+          <p:cNvPr id="90" name="Curved Connector 89"/>
+          <p:cNvCxnSpPr>
+            <a:stCxn id="12" idx="7"/>
+            <a:endCxn id="12" idx="5"/>
+          </p:cNvCxnSpPr>
+          <p:nvPr/>
+        </p:nvCxnSpPr>
+        <p:spPr>
+          <a:xfrm rot="16200000" flipH="1">
+            <a:off x="5638800" y="2057400"/>
+            <a:ext cx="323290" cy="12700"/>
+          </a:xfrm>
+          <a:prstGeom prst="curvedConnector5">
+            <a:avLst>
+              <a:gd name="adj1" fmla="val -70711"/>
+              <a:gd name="adj2" fmla="val 4872795"/>
+              <a:gd name="adj3" fmla="val 170711"/>
+            </a:avLst>
+          </a:prstGeom>
+          <a:ln>
+            <a:solidFill>
+              <a:schemeClr val="tx1">
+                <a:lumMod val="65000"/>
+                <a:lumOff val="35000"/>
+              </a:schemeClr>
+            </a:solidFill>
+            <a:tailEnd type="arrow"/>
+          </a:ln>
+        </p:spPr>
+        <p:style>
+          <a:lnRef idx="1">
+            <a:schemeClr val="accent1"/>
+          </a:lnRef>
+          <a:fillRef idx="0">
+            <a:schemeClr val="accent1"/>
+          </a:fillRef>
+          <a:effectRef idx="0">
+            <a:schemeClr val="accent1"/>
+          </a:effectRef>
+          <a:fontRef idx="minor">
+            <a:schemeClr val="tx1"/>
+          </a:fontRef>
+        </p:style>
+      </p:cxnSp>
+      <p:sp>
+        <p:nvSpPr>
+          <p:cNvPr id="93" name="TextBox 92"/>
+          <p:cNvSpPr txBox="1"/>
+          <p:nvPr/>
+        </p:nvSpPr>
+        <p:spPr>
+          <a:xfrm>
+            <a:off x="5832262" y="1828800"/>
+            <a:ext cx="679994" cy="246221"/>
+          </a:xfrm>
+          <a:prstGeom prst="rect">
+            <a:avLst/>
+          </a:prstGeom>
+          <a:noFill/>
+        </p:spPr>
+        <p:txBody>
+          <a:bodyPr wrap="none" rtlCol="0">
+            <a:spAutoFit/>
+          </a:bodyPr>
+          <a:lstStyle/>
+          <a:p>
+            <a:r>
+              <a:rPr lang="en-US" sz="1000" dirty="0" smtClean="0"/>
+              <a:t>Feedback</a:t>
+            </a:r>
+            <a:endParaRPr lang="en-US" sz="1000" dirty="0"/>
+          </a:p>
+        </p:txBody>
+      </p:sp>
+    </p:spTree>
+    <p:extLst>
+      <p:ext uri="{BB962C8B-B14F-4D97-AF65-F5344CB8AC3E}">
+        <p14:creationId xmlns:p14="http://schemas.microsoft.com/office/powerpoint/2010/main" val="3105662551"/>
+      </p:ext>
+    </p:extLst>
+  </p:cSld>
+  <p:clrMapOvr>
+    <a:masterClrMapping/>
+  </p:clrMapOvr>
+</p:sld>
+</file>
+
 <file path=ppt/theme/theme1.xml><?xml version="1.0" encoding="utf-8"?>
 <a:theme xmlns:a="http://schemas.openxmlformats.org/drawingml/2006/main" name="Office Theme">
   <a:themeElements>

</xml_diff>